<commit_message>
Added PPTX to PDF conversion example
</commit_message>
<xml_diff>
--- a/Fallback-fonts/Based-on-script-type/.NET/Based-on-script-type/Data/Template.pptx
+++ b/Fallback-fonts/Based-on-script-type/.NET/Based-on-script-type/Data/Template.pptx
@@ -259,7 +259,7 @@
           <a:p>
             <a:fld id="{41254E71-885A-4901-B356-C49344D2F814}" type="datetimeFigureOut">
               <a:rPr lang="en-US" smtClean="0"/>
-              <a:t>9/14/2023</a:t>
+              <a:t>12/4/2024</a:t>
             </a:fld>
             <a:endParaRPr lang="en-US"/>
           </a:p>
@@ -457,7 +457,7 @@
           <a:p>
             <a:fld id="{41254E71-885A-4901-B356-C49344D2F814}" type="datetimeFigureOut">
               <a:rPr lang="en-US" smtClean="0"/>
-              <a:t>9/14/2023</a:t>
+              <a:t>12/4/2024</a:t>
             </a:fld>
             <a:endParaRPr lang="en-US"/>
           </a:p>
@@ -665,7 +665,7 @@
           <a:p>
             <a:fld id="{41254E71-885A-4901-B356-C49344D2F814}" type="datetimeFigureOut">
               <a:rPr lang="en-US" smtClean="0"/>
-              <a:t>9/14/2023</a:t>
+              <a:t>12/4/2024</a:t>
             </a:fld>
             <a:endParaRPr lang="en-US"/>
           </a:p>
@@ -863,7 +863,7 @@
           <a:p>
             <a:fld id="{41254E71-885A-4901-B356-C49344D2F814}" type="datetimeFigureOut">
               <a:rPr lang="en-US" smtClean="0"/>
-              <a:t>9/14/2023</a:t>
+              <a:t>12/4/2024</a:t>
             </a:fld>
             <a:endParaRPr lang="en-US"/>
           </a:p>
@@ -1138,7 +1138,7 @@
           <a:p>
             <a:fld id="{41254E71-885A-4901-B356-C49344D2F814}" type="datetimeFigureOut">
               <a:rPr lang="en-US" smtClean="0"/>
-              <a:t>9/14/2023</a:t>
+              <a:t>12/4/2024</a:t>
             </a:fld>
             <a:endParaRPr lang="en-US"/>
           </a:p>
@@ -1403,7 +1403,7 @@
           <a:p>
             <a:fld id="{41254E71-885A-4901-B356-C49344D2F814}" type="datetimeFigureOut">
               <a:rPr lang="en-US" smtClean="0"/>
-              <a:t>9/14/2023</a:t>
+              <a:t>12/4/2024</a:t>
             </a:fld>
             <a:endParaRPr lang="en-US"/>
           </a:p>
@@ -1815,7 +1815,7 @@
           <a:p>
             <a:fld id="{41254E71-885A-4901-B356-C49344D2F814}" type="datetimeFigureOut">
               <a:rPr lang="en-US" smtClean="0"/>
-              <a:t>9/14/2023</a:t>
+              <a:t>12/4/2024</a:t>
             </a:fld>
             <a:endParaRPr lang="en-US"/>
           </a:p>
@@ -1956,7 +1956,7 @@
           <a:p>
             <a:fld id="{41254E71-885A-4901-B356-C49344D2F814}" type="datetimeFigureOut">
               <a:rPr lang="en-US" smtClean="0"/>
-              <a:t>9/14/2023</a:t>
+              <a:t>12/4/2024</a:t>
             </a:fld>
             <a:endParaRPr lang="en-US"/>
           </a:p>
@@ -2069,7 +2069,7 @@
           <a:p>
             <a:fld id="{41254E71-885A-4901-B356-C49344D2F814}" type="datetimeFigureOut">
               <a:rPr lang="en-US" smtClean="0"/>
-              <a:t>9/14/2023</a:t>
+              <a:t>12/4/2024</a:t>
             </a:fld>
             <a:endParaRPr lang="en-US"/>
           </a:p>
@@ -2380,7 +2380,7 @@
           <a:p>
             <a:fld id="{41254E71-885A-4901-B356-C49344D2F814}" type="datetimeFigureOut">
               <a:rPr lang="en-US" smtClean="0"/>
-              <a:t>9/14/2023</a:t>
+              <a:t>12/4/2024</a:t>
             </a:fld>
             <a:endParaRPr lang="en-US"/>
           </a:p>
@@ -2668,7 +2668,7 @@
           <a:p>
             <a:fld id="{41254E71-885A-4901-B356-C49344D2F814}" type="datetimeFigureOut">
               <a:rPr lang="en-US" smtClean="0"/>
-              <a:t>9/14/2023</a:t>
+              <a:t>12/4/2024</a:t>
             </a:fld>
             <a:endParaRPr lang="en-US"/>
           </a:p>
@@ -2909,7 +2909,7 @@
           <a:p>
             <a:fld id="{41254E71-885A-4901-B356-C49344D2F814}" type="datetimeFigureOut">
               <a:rPr lang="en-US" smtClean="0"/>
-              <a:t>9/14/2023</a:t>
+              <a:t>12/4/2024</a:t>
             </a:fld>
             <a:endParaRPr lang="en-US"/>
           </a:p>
@@ -3341,7 +3341,7 @@
         <p:spPr>
           <a:xfrm>
             <a:off x="3159760" y="2274838"/>
-            <a:ext cx="5090160" cy="3139321"/>
+            <a:ext cx="5090160" cy="2368854"/>
           </a:xfrm>
           <a:prstGeom prst="rect">
             <a:avLst/>
@@ -3354,186 +3354,235 @@
           </a:bodyPr>
           <a:lstStyle/>
           <a:p>
-            <a:r>
-              <a:rPr lang="en-US" dirty="0"/>
-              <a:t>“Hello world” in Hindi - </a:t>
-            </a:r>
-            <a:r>
-              <a:rPr kumimoji="0" lang="hi-IN" altLang="en-US" sz="1800" b="0" i="0" u="none" strike="noStrike" cap="none" normalizeH="0" baseline="0" dirty="0">
-                <a:ln>
-                  <a:noFill/>
-                </a:ln>
-                <a:solidFill>
-                  <a:srgbClr val="202124"/>
-                </a:solidFill>
+            <a:pPr marL="0" marR="0">
+              <a:lnSpc>
+                <a:spcPct val="107000"/>
+              </a:lnSpc>
+              <a:spcBef>
+                <a:spcPts val="0"/>
+              </a:spcBef>
+              <a:spcAft>
+                <a:spcPts val="800"/>
+              </a:spcAft>
+            </a:pPr>
+            <a:r>
+              <a:rPr lang="en-US" sz="1800" kern="100" dirty="0">
                 <a:effectLst/>
-                <a:latin typeface="Calibri" panose="020B0503020000020004" pitchFamily="34" charset="-127"/>
-                <a:ea typeface="Calibri" panose="020B0503020000020004" pitchFamily="34" charset="-127"/>
-                <a:cs typeface="Calibri" panose="020B0604020202020204" pitchFamily="34" charset="0"/>
+                <a:latin typeface="Calibri" panose="020F0502020204030204" pitchFamily="34" charset="0"/>
+                <a:ea typeface="Calibri" panose="020F0502020204030204" pitchFamily="34" charset="0"/>
+                <a:cs typeface="Arial" panose="020B0604020202020204" pitchFamily="34" charset="0"/>
               </a:rPr>
-              <a:t>हैलो वर्ल्ड</a:t>
-            </a:r>
-            <a:endParaRPr kumimoji="0" lang="en-US" altLang="en-US" sz="1400" b="0" i="0" u="none" strike="noStrike" cap="none" normalizeH="0" baseline="0" dirty="0">
-              <a:ln>
-                <a:noFill/>
-              </a:ln>
-              <a:solidFill>
-                <a:schemeClr val="tx1"/>
-              </a:solidFill>
+              <a:t>“Hello” in Hebrew - </a:t>
+            </a:r>
+            <a:r>
+              <a:rPr lang="he-IL" sz="1800" kern="100" dirty="0">
+                <a:effectLst/>
+                <a:latin typeface="Calibri" panose="020F0502020204030204" pitchFamily="34" charset="0"/>
+                <a:ea typeface="Calibri" panose="020F0502020204030204" pitchFamily="34" charset="0"/>
+                <a:cs typeface="Chiller" panose="04020404031007020602" pitchFamily="82" charset="0"/>
+              </a:rPr>
+              <a:t>שלום</a:t>
+            </a:r>
+            <a:endParaRPr lang="en-US" sz="1800" kern="100" dirty="0">
               <a:effectLst/>
-              <a:latin typeface="Arial" panose="020B0604020202020204" pitchFamily="34" charset="0"/>
+              <a:latin typeface="Calibri" panose="020F0502020204030204" pitchFamily="34" charset="0"/>
+              <a:ea typeface="Calibri" panose="020F0502020204030204" pitchFamily="34" charset="0"/>
+              <a:cs typeface="Arial" panose="020B0604020202020204" pitchFamily="34" charset="0"/>
             </a:endParaRPr>
           </a:p>
           <a:p>
-            <a:endParaRPr lang="en-US" dirty="0"/>
-          </a:p>
-          <a:p>
-            <a:r>
-              <a:rPr lang="en-US" dirty="0"/>
-              <a:t>“Hello world” in Chinese - </a:t>
-            </a:r>
-            <a:r>
-              <a:rPr kumimoji="0" lang="zh-CN" altLang="en-US" b="0" i="0" u="none" strike="noStrike" cap="none" normalizeH="0" baseline="0" dirty="0">
-                <a:ln>
-                  <a:noFill/>
-                </a:ln>
-                <a:solidFill>
-                  <a:srgbClr val="202124"/>
-                </a:solidFill>
+            <a:pPr marL="0" marR="0">
+              <a:lnSpc>
+                <a:spcPct val="107000"/>
+              </a:lnSpc>
+              <a:spcBef>
+                <a:spcPts val="0"/>
+              </a:spcBef>
+              <a:spcAft>
+                <a:spcPts val="800"/>
+              </a:spcAft>
+            </a:pPr>
+            <a:r>
+              <a:rPr lang="en-US" sz="1800" kern="100" dirty="0">
                 <a:effectLst/>
-                <a:latin typeface="Calibri" panose="020B0503020000020004" pitchFamily="34" charset="-127"/>
-                <a:ea typeface="Calibri" panose="020B0503020000020004" pitchFamily="34" charset="-127"/>
-                <a:cs typeface="Calibri" panose="020B0604020202020204" pitchFamily="34" charset="0"/>
+                <a:latin typeface="Calibri" panose="020F0502020204030204" pitchFamily="34" charset="0"/>
+                <a:ea typeface="Calibri" panose="020F0502020204030204" pitchFamily="34" charset="0"/>
+                <a:cs typeface="Arial" panose="020B0604020202020204" pitchFamily="34" charset="0"/>
               </a:rPr>
-              <a:t>你好世界</a:t>
-            </a:r>
-            <a:endParaRPr lang="en-US" dirty="0">
-              <a:latin typeface="DengXian" panose="02010600030101010101" pitchFamily="2" charset="-122"/>
-              <a:ea typeface="DengXian" panose="02010600030101010101" pitchFamily="2" charset="-122"/>
+              <a:t>“Hello” in Chinese text - </a:t>
+            </a:r>
+            <a:r>
+              <a:rPr lang="en-US" sz="1800" kern="100" dirty="0" err="1">
+                <a:effectLst/>
+                <a:latin typeface="Calibri" panose="020F0502020204030204" pitchFamily="34" charset="0"/>
+                <a:ea typeface="Calibri" panose="020F0502020204030204" pitchFamily="34" charset="0"/>
+                <a:cs typeface="Calibri" panose="020F0502020204030204" pitchFamily="34" charset="0"/>
+              </a:rPr>
+              <a:t>你好</a:t>
+            </a:r>
+            <a:endParaRPr lang="en-US" sz="1800" kern="100" dirty="0">
+              <a:effectLst/>
+              <a:latin typeface="Calibri" panose="020F0502020204030204" pitchFamily="34" charset="0"/>
+              <a:ea typeface="Calibri" panose="020F0502020204030204" pitchFamily="34" charset="0"/>
+              <a:cs typeface="Arial" panose="020B0604020202020204" pitchFamily="34" charset="0"/>
             </a:endParaRPr>
           </a:p>
           <a:p>
-            <a:endParaRPr lang="en-US" dirty="0"/>
-          </a:p>
-          <a:p>
-            <a:r>
-              <a:rPr lang="en-US" dirty="0"/>
-              <a:t>"Hello world” in Japanese - </a:t>
-            </a:r>
-            <a:r>
-              <a:rPr kumimoji="0" lang="ja-JP" altLang="en-US" sz="1800" b="0" i="0" u="none" strike="noStrike" cap="none" normalizeH="0" baseline="0" dirty="0">
-                <a:ln>
-                  <a:noFill/>
-                </a:ln>
-                <a:solidFill>
-                  <a:srgbClr val="202124"/>
-                </a:solidFill>
+            <a:pPr marL="0" marR="0">
+              <a:lnSpc>
+                <a:spcPct val="107000"/>
+              </a:lnSpc>
+              <a:spcBef>
+                <a:spcPts val="0"/>
+              </a:spcBef>
+              <a:spcAft>
+                <a:spcPts val="800"/>
+              </a:spcAft>
+            </a:pPr>
+            <a:r>
+              <a:rPr lang="en-US" sz="1800" kern="100" dirty="0">
                 <a:effectLst/>
-                <a:latin typeface="Calibri" panose="020B0503020000020004" pitchFamily="34" charset="-127"/>
-                <a:ea typeface="Calibri" panose="020B0503020000020004" pitchFamily="34" charset="-127"/>
-                <a:cs typeface="Calibri" panose="020B0604020202020204" pitchFamily="34" charset="0"/>
+                <a:latin typeface="Calibri" panose="020F0502020204030204" pitchFamily="34" charset="0"/>
+                <a:ea typeface="Calibri" panose="020F0502020204030204" pitchFamily="34" charset="0"/>
+                <a:cs typeface="Arial" panose="020B0604020202020204" pitchFamily="34" charset="0"/>
+              </a:rPr>
+              <a:t>“Hello” in Japanese text - </a:t>
+            </a:r>
+            <a:r>
+              <a:rPr lang="en-US" sz="1800" kern="100" dirty="0" err="1">
+                <a:effectLst/>
+                <a:latin typeface="Calibri" panose="020F0502020204030204" pitchFamily="34" charset="0"/>
+                <a:ea typeface="Calibri" panose="020F0502020204030204" pitchFamily="34" charset="0"/>
+                <a:cs typeface="Calibri" panose="020F0502020204030204" pitchFamily="34" charset="0"/>
               </a:rPr>
               <a:t>こんにちは</a:t>
             </a:r>
-            <a:endParaRPr kumimoji="0" lang="en-US" altLang="ja-JP" sz="1800" b="0" i="0" u="none" strike="noStrike" cap="none" normalizeH="0" baseline="0" dirty="0">
-              <a:ln>
-                <a:noFill/>
-              </a:ln>
-              <a:solidFill>
-                <a:srgbClr val="202124"/>
-              </a:solidFill>
+            <a:endParaRPr lang="en-US" sz="1800" kern="100" dirty="0">
               <a:effectLst/>
-              <a:latin typeface="Calibri" panose="020B0503020000020004" pitchFamily="34" charset="-127"/>
-              <a:ea typeface="Calibri" panose="020B0503020000020004" pitchFamily="34" charset="-127"/>
-              <a:cs typeface="Calibri" panose="020B0604020202020204" pitchFamily="34" charset="0"/>
-            </a:endParaRPr>
-          </a:p>
-          <a:p>
-            <a:endParaRPr kumimoji="0" lang="ja-JP" altLang="en-US" sz="1800" b="0" i="0" u="none" strike="noStrike" cap="none" normalizeH="0" baseline="0" dirty="0">
-              <a:ln>
-                <a:noFill/>
-              </a:ln>
-              <a:solidFill>
-                <a:srgbClr val="202124"/>
-              </a:solidFill>
-              <a:effectLst/>
-              <a:latin typeface="Arial" panose="020B0503020000020004" pitchFamily="34" charset="-127"/>
-              <a:ea typeface="Arial" panose="020B0503020000020004" pitchFamily="34" charset="-127"/>
+              <a:latin typeface="Calibri" panose="020F0502020204030204" pitchFamily="34" charset="0"/>
+              <a:ea typeface="Calibri" panose="020F0502020204030204" pitchFamily="34" charset="0"/>
               <a:cs typeface="Arial" panose="020B0604020202020204" pitchFamily="34" charset="0"/>
             </a:endParaRPr>
           </a:p>
           <a:p>
-            <a:r>
-              <a:rPr lang="en-US" dirty="0"/>
-              <a:t>“Hello world” in Korean - </a:t>
-            </a:r>
-            <a:r>
-              <a:rPr kumimoji="0" lang="ko-KR" altLang="en-US" b="0" i="0" u="none" strike="noStrike" cap="none" normalizeH="0" baseline="0" dirty="0">
-                <a:ln>
-                  <a:noFill/>
-                </a:ln>
-                <a:solidFill>
-                  <a:srgbClr val="202124"/>
-                </a:solidFill>
+            <a:pPr marL="0" marR="0">
+              <a:lnSpc>
+                <a:spcPct val="107000"/>
+              </a:lnSpc>
+              <a:spcBef>
+                <a:spcPts val="0"/>
+              </a:spcBef>
+              <a:spcAft>
+                <a:spcPts val="800"/>
+              </a:spcAft>
+            </a:pPr>
+            <a:r>
+              <a:rPr lang="en-US" sz="1800" kern="100" dirty="0">
                 <a:effectLst/>
-                <a:latin typeface="Calibri" panose="020B0503020000020004" pitchFamily="34" charset="-127"/>
-                <a:ea typeface="Calibri" panose="020B0503020000020004" pitchFamily="34" charset="-127"/>
-                <a:cs typeface="Calibri" panose="020B0604020202020204" pitchFamily="34" charset="0"/>
+                <a:latin typeface="Calibri" panose="020F0502020204030204" pitchFamily="34" charset="0"/>
+                <a:ea typeface="Calibri" panose="020F0502020204030204" pitchFamily="34" charset="0"/>
+                <a:cs typeface="Arial" panose="020B0604020202020204" pitchFamily="34" charset="0"/>
               </a:rPr>
-              <a:t>안녕 세계</a:t>
-            </a:r>
-          </a:p>
-          <a:p>
-            <a:endParaRPr lang="en-US" dirty="0"/>
-          </a:p>
-          <a:p>
-            <a:r>
-              <a:rPr lang="en-US" dirty="0"/>
-              <a:t>“Hello world” in Arabic - </a:t>
-            </a:r>
-            <a:r>
-              <a:rPr kumimoji="0" lang="ar-SA" altLang="en-US" sz="1800" b="0" i="0" u="none" strike="noStrike" cap="none" normalizeH="0" baseline="0" dirty="0">
-                <a:ln>
-                  <a:noFill/>
-                </a:ln>
-                <a:solidFill>
-                  <a:srgbClr val="202124"/>
-                </a:solidFill>
+              <a:t>“Hello” in Thai text - </a:t>
+            </a:r>
+            <a:r>
+              <a:rPr lang="th-TH" sz="1800" kern="100" dirty="0">
                 <a:effectLst/>
-                <a:latin typeface="Chiller" panose="020B0503020000020004" pitchFamily="34" charset="-127"/>
-                <a:ea typeface="Chiller" panose="020B0503020000020004" pitchFamily="34" charset="-127"/>
-                <a:cs typeface="Chiller" panose="020B0604020202020204" pitchFamily="34" charset="0"/>
+                <a:latin typeface="Calibri" panose="020F0502020204030204" pitchFamily="34" charset="0"/>
+                <a:ea typeface="Calibri" panose="020F0502020204030204" pitchFamily="34" charset="0"/>
+                <a:cs typeface="Calibri" panose="020F0502020204030204" pitchFamily="34" charset="0"/>
               </a:rPr>
-              <a:t>مرحبا بالعالم</a:t>
-            </a:r>
-            <a:endParaRPr kumimoji="0" lang="en-US" altLang="en-US" sz="1400" b="0" i="0" u="none" strike="noStrike" cap="none" normalizeH="0" baseline="0" dirty="0">
-              <a:ln>
-                <a:noFill/>
-              </a:ln>
-              <a:solidFill>
-                <a:schemeClr val="tx1"/>
-              </a:solidFill>
+              <a:t>สวัสดี</a:t>
+            </a:r>
+            <a:endParaRPr lang="en-US" sz="1800" kern="100" dirty="0">
               <a:effectLst/>
-              <a:latin typeface="Arial" panose="020B0604020202020204" pitchFamily="34" charset="0"/>
+              <a:latin typeface="Calibri" panose="020F0502020204030204" pitchFamily="34" charset="0"/>
+              <a:ea typeface="Calibri" panose="020F0502020204030204" pitchFamily="34" charset="0"/>
+              <a:cs typeface="Arial" panose="020B0604020202020204" pitchFamily="34" charset="0"/>
             </a:endParaRPr>
           </a:p>
           <a:p>
-            <a:endParaRPr lang="en-US" dirty="0"/>
-          </a:p>
-          <a:p>
-            <a:r>
-              <a:rPr lang="en-US" dirty="0"/>
-              <a:t>“Hello world” in Hebrew - </a:t>
-            </a:r>
-            <a:r>
-              <a:rPr lang="he-IL" dirty="0">
-                <a:latin typeface="Chiller" panose="020B0503020000020004" pitchFamily="34" charset="-127"/>
-                <a:ea typeface="Chiller" panose="020B0503020000020004" pitchFamily="34" charset="-127"/>
-                <a:cs typeface="Chiller" panose="020B0604020202020204" pitchFamily="34" charset="0"/>
+            <a:pPr marL="0" marR="0">
+              <a:lnSpc>
+                <a:spcPct val="107000"/>
+              </a:lnSpc>
+              <a:spcBef>
+                <a:spcPts val="0"/>
+              </a:spcBef>
+              <a:spcAft>
+                <a:spcPts val="800"/>
+              </a:spcAft>
+            </a:pPr>
+            <a:r>
+              <a:rPr lang="en-US" sz="1800" kern="100" dirty="0">
+                <a:effectLst/>
+                <a:latin typeface="Calibri" panose="020F0502020204030204" pitchFamily="34" charset="0"/>
+                <a:ea typeface="Calibri" panose="020F0502020204030204" pitchFamily="34" charset="0"/>
+                <a:cs typeface="Arial" panose="020B0604020202020204" pitchFamily="34" charset="0"/>
               </a:rPr>
-              <a:t>שלום עולם</a:t>
-            </a:r>
-            <a:endParaRPr lang="en-US" dirty="0"/>
+              <a:t>“Hello” in Korean text - </a:t>
+            </a:r>
+            <a:r>
+              <a:rPr lang="en-US" sz="1800" kern="100" dirty="0" err="1">
+                <a:effectLst/>
+                <a:latin typeface="Calibri" panose="020F0502020204030204" pitchFamily="34" charset="0"/>
+                <a:ea typeface="Calibri" panose="020F0502020204030204" pitchFamily="34" charset="0"/>
+                <a:cs typeface="Calibri" panose="020F0502020204030204" pitchFamily="34" charset="0"/>
+              </a:rPr>
+              <a:t>안녕하세요</a:t>
+            </a:r>
+            <a:r>
+              <a:rPr lang="en-US" sz="1800" kern="100" dirty="0">
+                <a:effectLst/>
+                <a:latin typeface="Calibri" panose="020F0502020204030204" pitchFamily="34" charset="0"/>
+                <a:ea typeface="Calibri" panose="020F0502020204030204" pitchFamily="34" charset="0"/>
+                <a:cs typeface="Calibri" panose="020F0502020204030204" pitchFamily="34" charset="0"/>
+              </a:rPr>
+              <a:t> </a:t>
+            </a:r>
+            <a:endParaRPr lang="en-US" sz="1800" kern="100" dirty="0">
+              <a:effectLst/>
+              <a:latin typeface="Calibri" panose="020F0502020204030204" pitchFamily="34" charset="0"/>
+              <a:ea typeface="Calibri" panose="020F0502020204030204" pitchFamily="34" charset="0"/>
+              <a:cs typeface="Arial" panose="020B0604020202020204" pitchFamily="34" charset="0"/>
+            </a:endParaRPr>
+          </a:p>
+          <a:p>
+            <a:pPr marL="0" marR="0">
+              <a:lnSpc>
+                <a:spcPct val="107000"/>
+              </a:lnSpc>
+              <a:spcBef>
+                <a:spcPts val="0"/>
+              </a:spcBef>
+              <a:spcAft>
+                <a:spcPts val="800"/>
+              </a:spcAft>
+            </a:pPr>
+            <a:r>
+              <a:rPr lang="en-US" sz="1800" kern="100" dirty="0">
+                <a:effectLst/>
+                <a:latin typeface="Calibri" panose="020F0502020204030204" pitchFamily="34" charset="0"/>
+                <a:ea typeface="Calibri" panose="020F0502020204030204" pitchFamily="34" charset="0"/>
+                <a:cs typeface="Calibri" panose="020F0502020204030204" pitchFamily="34" charset="0"/>
+              </a:rPr>
+              <a:t>“Hello” in Arabic text - </a:t>
+            </a:r>
+            <a:r>
+              <a:rPr lang="ar-SA" sz="1800" kern="100" dirty="0">
+                <a:effectLst/>
+                <a:latin typeface="Calibri" panose="020F0502020204030204" pitchFamily="34" charset="0"/>
+                <a:ea typeface="Chiller" panose="04020404031007020602" pitchFamily="82" charset="0"/>
+                <a:cs typeface="Chiller" panose="04020404031007020602" pitchFamily="82" charset="0"/>
+              </a:rPr>
+              <a:t>مرحبًا</a:t>
+            </a:r>
+            <a:endParaRPr lang="en-US" sz="1800" kern="100" dirty="0">
+              <a:effectLst/>
+              <a:latin typeface="Calibri" panose="020F0502020204030204" pitchFamily="34" charset="0"/>
+              <a:ea typeface="Calibri" panose="020F0502020204030204" pitchFamily="34" charset="0"/>
+              <a:cs typeface="Arial" panose="020B0604020202020204" pitchFamily="34" charset="0"/>
+            </a:endParaRPr>
           </a:p>
         </p:txBody>
       </p:sp>

</xml_diff>